<commit_message>
transferred into new organization
</commit_message>
<xml_diff>
--- a/Final/HybridModel_3470_Presentation.pptx
+++ b/Final/HybridModel_3470_Presentation.pptx
@@ -309,7 +309,7 @@
           <a:p>
             <a:fld id="{F5597993-FE1E-4023-B9F0-77351815C1CA}" type="datetimeFigureOut">
               <a:rPr lang="en-GB" smtClean="0"/>
-              <a:t>09/07/2022</a:t>
+              <a:t>11/07/2022</a:t>
             </a:fld>
             <a:endParaRPr lang="en-GB"/>
           </a:p>
@@ -9045,16 +9045,7 @@
                               </a:solidFill>
                               <a:latin typeface="Cambria Math" panose="02040503050406030204" pitchFamily="18" charset="0"/>
                             </a:rPr>
-                            <m:t>1</m:t>
-                          </m:r>
-                          <m:r>
-                            <a:rPr lang="en-US" sz="1600" b="0" i="1" smtClean="0">
-                              <a:solidFill>
-                                <a:schemeClr val="tx1"/>
-                              </a:solidFill>
-                              <a:latin typeface="Cambria Math" panose="02040503050406030204" pitchFamily="18" charset="0"/>
-                            </a:rPr>
-                            <m:t>−</m:t>
+                            <m:t>1−</m:t>
                           </m:r>
                           <m:sSub>
                             <m:sSubPr>
@@ -9154,16 +9145,7 @@
                               </a:solidFill>
                               <a:latin typeface="Cambria Math" panose="02040503050406030204" pitchFamily="18" charset="0"/>
                             </a:rPr>
-                            <m:t>−</m:t>
-                          </m:r>
-                          <m:r>
-                            <a:rPr lang="en-US" sz="1600" b="0" i="1" smtClean="0">
-                              <a:solidFill>
-                                <a:schemeClr val="tx1"/>
-                              </a:solidFill>
-                              <a:latin typeface="Cambria Math" panose="02040503050406030204" pitchFamily="18" charset="0"/>
-                            </a:rPr>
-                            <m:t>1</m:t>
+                            <m:t>−1</m:t>
                           </m:r>
                         </m:e>
                       </m:d>
@@ -9349,16 +9331,7 @@
                               </a:solidFill>
                               <a:latin typeface="Cambria Math" panose="02040503050406030204" pitchFamily="18" charset="0"/>
                             </a:rPr>
-                            <m:t>1</m:t>
-                          </m:r>
-                          <m:r>
-                            <a:rPr lang="en-US" sz="1600" i="1">
-                              <a:solidFill>
-                                <a:schemeClr val="tx1"/>
-                              </a:solidFill>
-                              <a:latin typeface="Cambria Math" panose="02040503050406030204" pitchFamily="18" charset="0"/>
-                            </a:rPr>
-                            <m:t>−</m:t>
+                            <m:t>1−</m:t>
                           </m:r>
                           <m:sSub>
                             <m:sSubPr>
@@ -9461,16 +9434,7 @@
                               </a:solidFill>
                               <a:latin typeface="Cambria Math" panose="02040503050406030204" pitchFamily="18" charset="0"/>
                             </a:rPr>
-                            <m:t>−</m:t>
-                          </m:r>
-                          <m:r>
-                            <a:rPr lang="en-US" sz="1600" i="1">
-                              <a:solidFill>
-                                <a:schemeClr val="tx1"/>
-                              </a:solidFill>
-                              <a:latin typeface="Cambria Math" panose="02040503050406030204" pitchFamily="18" charset="0"/>
-                            </a:rPr>
-                            <m:t>1</m:t>
+                            <m:t>−1</m:t>
                           </m:r>
                         </m:e>
                       </m:d>
@@ -9646,16 +9610,7 @@
                                       </a:solidFill>
                                       <a:latin typeface="Cambria Math" panose="02040503050406030204" pitchFamily="18" charset="0"/>
                                     </a:rPr>
-                                    <m:t>−</m:t>
-                                  </m:r>
-                                  <m:r>
-                                    <a:rPr lang="en-US" sz="1600" b="0" i="1" smtClean="0">
-                                      <a:solidFill>
-                                        <a:schemeClr val="tx1"/>
-                                      </a:solidFill>
-                                      <a:latin typeface="Cambria Math" panose="02040503050406030204" pitchFamily="18" charset="0"/>
-                                    </a:rPr>
-                                    <m:t>1</m:t>
+                                    <m:t>−1</m:t>
                                   </m:r>
                                 </m:e>
                               </m:d>
@@ -11122,16 +11077,7 @@
                             </a:solidFill>
                             <a:latin typeface="Cambria Math" panose="02040503050406030204" pitchFamily="18" charset="0"/>
                           </a:rPr>
-                          <m:t>𝑡</m:t>
-                        </m:r>
-                        <m:r>
-                          <a:rPr lang="en-US" sz="1400" b="0" i="1" smtClean="0">
-                            <a:solidFill>
-                              <a:schemeClr val="tx1"/>
-                            </a:solidFill>
-                            <a:latin typeface="Cambria Math" panose="02040503050406030204" pitchFamily="18" charset="0"/>
-                          </a:rPr>
-                          <m:t>h</m:t>
+                          <m:t>𝑡h</m:t>
                         </m:r>
                       </m:sub>
                     </m:sSub>
@@ -13305,16 +13251,7 @@
                             </a:solidFill>
                             <a:latin typeface="Cambria Math" panose="02040503050406030204" pitchFamily="18" charset="0"/>
                           </a:rPr>
-                          <m:t>𝑡</m:t>
-                        </m:r>
-                        <m:r>
-                          <a:rPr lang="en-US" sz="1400" b="0" i="1" smtClean="0">
-                            <a:solidFill>
-                              <a:schemeClr val="tx1"/>
-                            </a:solidFill>
-                            <a:latin typeface="Cambria Math" panose="02040503050406030204" pitchFamily="18" charset="0"/>
-                          </a:rPr>
-                          <m:t>h</m:t>
+                          <m:t>𝑡h</m:t>
                         </m:r>
                       </m:sub>
                     </m:sSub>
@@ -13789,19 +13726,7 @@
                                       <a:ea typeface="Times New Roman" panose="02020603050405020304" pitchFamily="18" charset="0"/>
                                       <a:cs typeface="Times New Roman" panose="02020603050405020304" pitchFamily="18" charset="0"/>
                                     </a:rPr>
-                                    <m:t>=</m:t>
-                                  </m:r>
-                                  <m:r>
-                                    <a:rPr lang="en-US" sz="1200" i="1">
-                                      <a:solidFill>
-                                        <a:schemeClr val="tx1"/>
-                                      </a:solidFill>
-                                      <a:effectLst/>
-                                      <a:latin typeface="Cambria Math" panose="02040503050406030204" pitchFamily="18" charset="0"/>
-                                      <a:ea typeface="Times New Roman" panose="02020603050405020304" pitchFamily="18" charset="0"/>
-                                      <a:cs typeface="Times New Roman" panose="02020603050405020304" pitchFamily="18" charset="0"/>
-                                    </a:rPr>
-                                    <m:t>1</m:t>
+                                    <m:t>=1</m:t>
                                   </m:r>
                                 </m:sub>
                                 <m:sup>
@@ -14031,19 +13956,7 @@
                                   <a:ea typeface="Times New Roman" panose="02020603050405020304" pitchFamily="18" charset="0"/>
                                   <a:cs typeface="Times New Roman" panose="02020603050405020304" pitchFamily="18" charset="0"/>
                                 </a:rPr>
-                                <m:t>−</m:t>
-                              </m:r>
-                              <m:r>
-                                <a:rPr lang="en-US" sz="1200" i="1">
-                                  <a:solidFill>
-                                    <a:schemeClr val="tx1"/>
-                                  </a:solidFill>
-                                  <a:effectLst/>
-                                  <a:latin typeface="Cambria Math" panose="02040503050406030204" pitchFamily="18" charset="0"/>
-                                  <a:ea typeface="Times New Roman" panose="02020603050405020304" pitchFamily="18" charset="0"/>
-                                  <a:cs typeface="Times New Roman" panose="02020603050405020304" pitchFamily="18" charset="0"/>
-                                </a:rPr>
-                                <m:t>1</m:t>
+                                <m:t>−1</m:t>
                               </m:r>
                             </m:den>
                           </m:f>
@@ -16014,8 +15927,8 @@
           </a:p>
         </p:txBody>
       </p:sp>
-      <mc:AlternateContent xmlns:mc="http://schemas.openxmlformats.org/markup-compatibility/2006">
-        <mc:Choice xmlns:a14="http://schemas.microsoft.com/office/drawing/2010/main" Requires="a14">
+      <mc:AlternateContent xmlns:mc="http://schemas.openxmlformats.org/markup-compatibility/2006" xmlns:a14="http://schemas.microsoft.com/office/drawing/2010/main">
+        <mc:Choice Requires="a14">
           <p:sp>
             <p:nvSpPr>
               <p:cNvPr id="4" name="Content Placeholder 3">
@@ -16126,7 +16039,7 @@
             </p:txBody>
           </p:sp>
         </mc:Choice>
-        <mc:Fallback>
+        <mc:Fallback xmlns="">
           <p:sp>
             <p:nvSpPr>
               <p:cNvPr id="4" name="Content Placeholder 3">
@@ -16681,8 +16594,8 @@
           </a:p>
         </p:txBody>
       </p:sp>
-      <mc:AlternateContent xmlns:mc="http://schemas.openxmlformats.org/markup-compatibility/2006">
-        <mc:Choice xmlns:a14="http://schemas.microsoft.com/office/drawing/2010/main" Requires="a14">
+      <mc:AlternateContent xmlns:mc="http://schemas.openxmlformats.org/markup-compatibility/2006" xmlns:a14="http://schemas.microsoft.com/office/drawing/2010/main">
+        <mc:Choice Requires="a14">
           <p:sp>
             <p:nvSpPr>
               <p:cNvPr id="3" name="Content Placeholder 2">
@@ -16988,7 +16901,7 @@
             </p:txBody>
           </p:sp>
         </mc:Choice>
-        <mc:Fallback>
+        <mc:Fallback xmlns="">
           <p:sp>
             <p:nvSpPr>
               <p:cNvPr id="3" name="Content Placeholder 2">
@@ -17891,115 +17804,7 @@
                                       <a:ea typeface="DengXian" panose="02010600030101010101" pitchFamily="2" charset="-122"/>
                                       <a:cs typeface="Times New Roman" panose="02020603050405020304" pitchFamily="18" charset="0"/>
                                     </a:rPr>
-                                    <m:t>−</m:t>
-                                  </m:r>
-                                  <m:r>
-                                    <a:rPr lang="en-US" sz="1800" i="1">
-                                      <a:solidFill>
-                                        <a:schemeClr val="tx1"/>
-                                      </a:solidFill>
-                                      <a:effectLst/>
-                                      <a:latin typeface="Cambria Math" panose="02040503050406030204" pitchFamily="18" charset="0"/>
-                                      <a:ea typeface="DengXian" panose="02010600030101010101" pitchFamily="2" charset="-122"/>
-                                      <a:cs typeface="Times New Roman" panose="02020603050405020304" pitchFamily="18" charset="0"/>
-                                    </a:rPr>
-                                    <m:t>1</m:t>
-                                  </m:r>
-                                  <m:r>
-                                    <a:rPr lang="en-US" sz="1800" i="1">
-                                      <a:solidFill>
-                                        <a:schemeClr val="tx1"/>
-                                      </a:solidFill>
-                                      <a:effectLst/>
-                                      <a:latin typeface="Cambria Math" panose="02040503050406030204" pitchFamily="18" charset="0"/>
-                                      <a:ea typeface="DengXian" panose="02010600030101010101" pitchFamily="2" charset="-122"/>
-                                      <a:cs typeface="Times New Roman" panose="02020603050405020304" pitchFamily="18" charset="0"/>
-                                    </a:rPr>
-                                    <m:t>−</m:t>
-                                  </m:r>
-                                  <m:r>
-                                    <a:rPr lang="en-US" sz="1800" i="1">
-                                      <a:solidFill>
-                                        <a:schemeClr val="tx1"/>
-                                      </a:solidFill>
-                                      <a:effectLst/>
-                                      <a:latin typeface="Cambria Math" panose="02040503050406030204" pitchFamily="18" charset="0"/>
-                                      <a:ea typeface="DengXian" panose="02010600030101010101" pitchFamily="2" charset="-122"/>
-                                      <a:cs typeface="Times New Roman" panose="02020603050405020304" pitchFamily="18" charset="0"/>
-                                    </a:rPr>
-                                    <m:t>1</m:t>
-                                  </m:r>
-                                  <m:r>
-                                    <a:rPr lang="en-US" sz="1800" i="1">
-                                      <a:solidFill>
-                                        <a:schemeClr val="tx1"/>
-                                      </a:solidFill>
-                                      <a:effectLst/>
-                                      <a:latin typeface="Cambria Math" panose="02040503050406030204" pitchFamily="18" charset="0"/>
-                                      <a:ea typeface="DengXian" panose="02010600030101010101" pitchFamily="2" charset="-122"/>
-                                      <a:cs typeface="Times New Roman" panose="02020603050405020304" pitchFamily="18" charset="0"/>
-                                    </a:rPr>
-                                    <m:t>+</m:t>
-                                  </m:r>
-                                  <m:r>
-                                    <a:rPr lang="en-US" sz="1800" i="1">
-                                      <a:solidFill>
-                                        <a:schemeClr val="tx1"/>
-                                      </a:solidFill>
-                                      <a:effectLst/>
-                                      <a:latin typeface="Cambria Math" panose="02040503050406030204" pitchFamily="18" charset="0"/>
-                                      <a:ea typeface="DengXian" panose="02010600030101010101" pitchFamily="2" charset="-122"/>
-                                      <a:cs typeface="Times New Roman" panose="02020603050405020304" pitchFamily="18" charset="0"/>
-                                    </a:rPr>
-                                    <m:t>1</m:t>
-                                  </m:r>
-                                  <m:r>
-                                    <a:rPr lang="en-US" sz="1800" i="1">
-                                      <a:solidFill>
-                                        <a:schemeClr val="tx1"/>
-                                      </a:solidFill>
-                                      <a:effectLst/>
-                                      <a:latin typeface="Cambria Math" panose="02040503050406030204" pitchFamily="18" charset="0"/>
-                                      <a:ea typeface="DengXian" panose="02010600030101010101" pitchFamily="2" charset="-122"/>
-                                      <a:cs typeface="Times New Roman" panose="02020603050405020304" pitchFamily="18" charset="0"/>
-                                    </a:rPr>
-                                    <m:t>+</m:t>
-                                  </m:r>
-                                  <m:r>
-                                    <a:rPr lang="en-US" sz="1800" i="1">
-                                      <a:solidFill>
-                                        <a:schemeClr val="tx1"/>
-                                      </a:solidFill>
-                                      <a:effectLst/>
-                                      <a:latin typeface="Cambria Math" panose="02040503050406030204" pitchFamily="18" charset="0"/>
-                                      <a:ea typeface="DengXian" panose="02010600030101010101" pitchFamily="2" charset="-122"/>
-                                      <a:cs typeface="Times New Roman" panose="02020603050405020304" pitchFamily="18" charset="0"/>
-                                    </a:rPr>
-                                    <m:t>1</m:t>
-                                  </m:r>
-                                  <m:r>
-                                    <a:rPr lang="en-US" sz="1800" i="1">
-                                      <a:solidFill>
-                                        <a:schemeClr val="tx1"/>
-                                      </a:solidFill>
-                                      <a:effectLst/>
-                                      <a:latin typeface="Cambria Math" panose="02040503050406030204" pitchFamily="18" charset="0"/>
-                                      <a:ea typeface="DengXian" panose="02010600030101010101" pitchFamily="2" charset="-122"/>
-                                      <a:cs typeface="Times New Roman" panose="02020603050405020304" pitchFamily="18" charset="0"/>
-                                    </a:rPr>
-                                    <m:t>.</m:t>
-                                  </m:r>
-                                  <m:r>
-                                    <a:rPr lang="en-US" sz="1800" i="1">
-                                      <a:solidFill>
-                                        <a:schemeClr val="tx1"/>
-                                      </a:solidFill>
-                                      <a:effectLst/>
-                                      <a:latin typeface="Cambria Math" panose="02040503050406030204" pitchFamily="18" charset="0"/>
-                                      <a:ea typeface="DengXian" panose="02010600030101010101" pitchFamily="2" charset="-122"/>
-                                      <a:cs typeface="Times New Roman" panose="02020603050405020304" pitchFamily="18" charset="0"/>
-                                    </a:rPr>
-                                    <m:t>1</m:t>
+                                    <m:t>−1−1+1+1.1</m:t>
                                   </m:r>
                                 </m:e>
                               </m:d>
@@ -18038,139 +17843,7 @@
                                       <a:ea typeface="DengXian" panose="02010600030101010101" pitchFamily="2" charset="-122"/>
                                       <a:cs typeface="Times New Roman" panose="02020603050405020304" pitchFamily="18" charset="0"/>
                                     </a:rPr>
-                                    <m:t>−</m:t>
-                                  </m:r>
-                                  <m:r>
-                                    <a:rPr lang="en-US" sz="1800" i="1">
-                                      <a:solidFill>
-                                        <a:schemeClr val="tx1"/>
-                                      </a:solidFill>
-                                      <a:effectLst/>
-                                      <a:latin typeface="Cambria Math" panose="02040503050406030204" pitchFamily="18" charset="0"/>
-                                      <a:ea typeface="DengXian" panose="02010600030101010101" pitchFamily="2" charset="-122"/>
-                                      <a:cs typeface="Times New Roman" panose="02020603050405020304" pitchFamily="18" charset="0"/>
-                                    </a:rPr>
-                                    <m:t>0</m:t>
-                                  </m:r>
-                                  <m:r>
-                                    <a:rPr lang="en-US" sz="1800" i="1">
-                                      <a:solidFill>
-                                        <a:schemeClr val="tx1"/>
-                                      </a:solidFill>
-                                      <a:effectLst/>
-                                      <a:latin typeface="Cambria Math" panose="02040503050406030204" pitchFamily="18" charset="0"/>
-                                      <a:ea typeface="DengXian" panose="02010600030101010101" pitchFamily="2" charset="-122"/>
-                                      <a:cs typeface="Times New Roman" panose="02020603050405020304" pitchFamily="18" charset="0"/>
-                                    </a:rPr>
-                                    <m:t>.</m:t>
-                                  </m:r>
-                                  <m:r>
-                                    <a:rPr lang="en-US" sz="1800" i="1">
-                                      <a:solidFill>
-                                        <a:schemeClr val="tx1"/>
-                                      </a:solidFill>
-                                      <a:effectLst/>
-                                      <a:latin typeface="Cambria Math" panose="02040503050406030204" pitchFamily="18" charset="0"/>
-                                      <a:ea typeface="DengXian" panose="02010600030101010101" pitchFamily="2" charset="-122"/>
-                                      <a:cs typeface="Times New Roman" panose="02020603050405020304" pitchFamily="18" charset="0"/>
-                                    </a:rPr>
-                                    <m:t>9</m:t>
-                                  </m:r>
-                                  <m:r>
-                                    <a:rPr lang="en-US" sz="1800" i="1">
-                                      <a:solidFill>
-                                        <a:schemeClr val="tx1"/>
-                                      </a:solidFill>
-                                      <a:effectLst/>
-                                      <a:latin typeface="Cambria Math" panose="02040503050406030204" pitchFamily="18" charset="0"/>
-                                      <a:ea typeface="DengXian" panose="02010600030101010101" pitchFamily="2" charset="-122"/>
-                                      <a:cs typeface="Times New Roman" panose="02020603050405020304" pitchFamily="18" charset="0"/>
-                                    </a:rPr>
-                                    <m:t>−</m:t>
-                                  </m:r>
-                                  <m:r>
-                                    <a:rPr lang="en-US" sz="1800" i="1">
-                                      <a:solidFill>
-                                        <a:schemeClr val="tx1"/>
-                                      </a:solidFill>
-                                      <a:effectLst/>
-                                      <a:latin typeface="Cambria Math" panose="02040503050406030204" pitchFamily="18" charset="0"/>
-                                      <a:ea typeface="DengXian" panose="02010600030101010101" pitchFamily="2" charset="-122"/>
-                                      <a:cs typeface="Times New Roman" panose="02020603050405020304" pitchFamily="18" charset="0"/>
-                                    </a:rPr>
-                                    <m:t>1</m:t>
-                                  </m:r>
-                                  <m:r>
-                                    <a:rPr lang="en-US" sz="1800" i="1">
-                                      <a:solidFill>
-                                        <a:schemeClr val="tx1"/>
-                                      </a:solidFill>
-                                      <a:effectLst/>
-                                      <a:latin typeface="Cambria Math" panose="02040503050406030204" pitchFamily="18" charset="0"/>
-                                      <a:ea typeface="DengXian" panose="02010600030101010101" pitchFamily="2" charset="-122"/>
-                                      <a:cs typeface="Times New Roman" panose="02020603050405020304" pitchFamily="18" charset="0"/>
-                                    </a:rPr>
-                                    <m:t>.</m:t>
-                                  </m:r>
-                                  <m:r>
-                                    <a:rPr lang="en-US" sz="1800" i="1">
-                                      <a:solidFill>
-                                        <a:schemeClr val="tx1"/>
-                                      </a:solidFill>
-                                      <a:effectLst/>
-                                      <a:latin typeface="Cambria Math" panose="02040503050406030204" pitchFamily="18" charset="0"/>
-                                      <a:ea typeface="DengXian" panose="02010600030101010101" pitchFamily="2" charset="-122"/>
-                                      <a:cs typeface="Times New Roman" panose="02020603050405020304" pitchFamily="18" charset="0"/>
-                                    </a:rPr>
-                                    <m:t>1</m:t>
-                                  </m:r>
-                                  <m:r>
-                                    <a:rPr lang="en-US" sz="1800" i="1">
-                                      <a:solidFill>
-                                        <a:schemeClr val="tx1"/>
-                                      </a:solidFill>
-                                      <a:effectLst/>
-                                      <a:latin typeface="Cambria Math" panose="02040503050406030204" pitchFamily="18" charset="0"/>
-                                      <a:ea typeface="DengXian" panose="02010600030101010101" pitchFamily="2" charset="-122"/>
-                                      <a:cs typeface="Times New Roman" panose="02020603050405020304" pitchFamily="18" charset="0"/>
-                                    </a:rPr>
-                                    <m:t>+</m:t>
-                                  </m:r>
-                                  <m:r>
-                                    <a:rPr lang="en-US" sz="1800" i="1">
-                                      <a:solidFill>
-                                        <a:schemeClr val="tx1"/>
-                                      </a:solidFill>
-                                      <a:effectLst/>
-                                      <a:latin typeface="Cambria Math" panose="02040503050406030204" pitchFamily="18" charset="0"/>
-                                      <a:ea typeface="DengXian" panose="02010600030101010101" pitchFamily="2" charset="-122"/>
-                                      <a:cs typeface="Times New Roman" panose="02020603050405020304" pitchFamily="18" charset="0"/>
-                                    </a:rPr>
-                                    <m:t>1</m:t>
-                                  </m:r>
-                                  <m:r>
-                                    <a:rPr lang="en-US" sz="1800" i="1">
-                                      <a:solidFill>
-                                        <a:schemeClr val="tx1"/>
-                                      </a:solidFill>
-                                      <a:effectLst/>
-                                      <a:latin typeface="Cambria Math" panose="02040503050406030204" pitchFamily="18" charset="0"/>
-                                      <a:ea typeface="DengXian" panose="02010600030101010101" pitchFamily="2" charset="-122"/>
-                                      <a:cs typeface="Times New Roman" panose="02020603050405020304" pitchFamily="18" charset="0"/>
-                                    </a:rPr>
-                                    <m:t>+</m:t>
-                                  </m:r>
-                                  <m:r>
-                                    <a:rPr lang="en-US" sz="1800" i="1">
-                                      <a:solidFill>
-                                        <a:schemeClr val="tx1"/>
-                                      </a:solidFill>
-                                      <a:effectLst/>
-                                      <a:latin typeface="Cambria Math" panose="02040503050406030204" pitchFamily="18" charset="0"/>
-                                      <a:ea typeface="DengXian" panose="02010600030101010101" pitchFamily="2" charset="-122"/>
-                                      <a:cs typeface="Times New Roman" panose="02020603050405020304" pitchFamily="18" charset="0"/>
-                                    </a:rPr>
-                                    <m:t>1</m:t>
+                                    <m:t>−0.9−1.1+1+1</m:t>
                                   </m:r>
                                 </m:e>
                               </m:d>
@@ -18199,115 +17872,7 @@
                                       <a:ea typeface="DengXian" panose="02010600030101010101" pitchFamily="2" charset="-122"/>
                                       <a:cs typeface="Times New Roman" panose="02020603050405020304" pitchFamily="18" charset="0"/>
                                     </a:rPr>
-                                    <m:t>−</m:t>
-                                  </m:r>
-                                  <m:r>
-                                    <a:rPr lang="en-US" sz="1800" i="1">
-                                      <a:solidFill>
-                                        <a:schemeClr val="tx1"/>
-                                      </a:solidFill>
-                                      <a:effectLst/>
-                                      <a:latin typeface="Cambria Math" panose="02040503050406030204" pitchFamily="18" charset="0"/>
-                                      <a:ea typeface="DengXian" panose="02010600030101010101" pitchFamily="2" charset="-122"/>
-                                      <a:cs typeface="Times New Roman" panose="02020603050405020304" pitchFamily="18" charset="0"/>
-                                    </a:rPr>
-                                    <m:t>1</m:t>
-                                  </m:r>
-                                  <m:r>
-                                    <a:rPr lang="en-US" sz="1800" i="1">
-                                      <a:solidFill>
-                                        <a:schemeClr val="tx1"/>
-                                      </a:solidFill>
-                                      <a:effectLst/>
-                                      <a:latin typeface="Cambria Math" panose="02040503050406030204" pitchFamily="18" charset="0"/>
-                                      <a:ea typeface="DengXian" panose="02010600030101010101" pitchFamily="2" charset="-122"/>
-                                      <a:cs typeface="Times New Roman" panose="02020603050405020304" pitchFamily="18" charset="0"/>
-                                    </a:rPr>
-                                    <m:t>−</m:t>
-                                  </m:r>
-                                  <m:r>
-                                    <a:rPr lang="en-US" sz="1800" i="1">
-                                      <a:solidFill>
-                                        <a:schemeClr val="tx1"/>
-                                      </a:solidFill>
-                                      <a:effectLst/>
-                                      <a:latin typeface="Cambria Math" panose="02040503050406030204" pitchFamily="18" charset="0"/>
-                                      <a:ea typeface="DengXian" panose="02010600030101010101" pitchFamily="2" charset="-122"/>
-                                      <a:cs typeface="Times New Roman" panose="02020603050405020304" pitchFamily="18" charset="0"/>
-                                    </a:rPr>
-                                    <m:t>1</m:t>
-                                  </m:r>
-                                  <m:r>
-                                    <a:rPr lang="en-US" sz="1800" i="1">
-                                      <a:solidFill>
-                                        <a:schemeClr val="tx1"/>
-                                      </a:solidFill>
-                                      <a:effectLst/>
-                                      <a:latin typeface="Cambria Math" panose="02040503050406030204" pitchFamily="18" charset="0"/>
-                                      <a:ea typeface="DengXian" panose="02010600030101010101" pitchFamily="2" charset="-122"/>
-                                      <a:cs typeface="Times New Roman" panose="02020603050405020304" pitchFamily="18" charset="0"/>
-                                    </a:rPr>
-                                    <m:t>+</m:t>
-                                  </m:r>
-                                  <m:r>
-                                    <a:rPr lang="en-US" sz="1800" i="1">
-                                      <a:solidFill>
-                                        <a:schemeClr val="tx1"/>
-                                      </a:solidFill>
-                                      <a:effectLst/>
-                                      <a:latin typeface="Cambria Math" panose="02040503050406030204" pitchFamily="18" charset="0"/>
-                                      <a:ea typeface="DengXian" panose="02010600030101010101" pitchFamily="2" charset="-122"/>
-                                      <a:cs typeface="Times New Roman" panose="02020603050405020304" pitchFamily="18" charset="0"/>
-                                    </a:rPr>
-                                    <m:t>1</m:t>
-                                  </m:r>
-                                  <m:r>
-                                    <a:rPr lang="en-US" sz="1800" i="1">
-                                      <a:solidFill>
-                                        <a:schemeClr val="tx1"/>
-                                      </a:solidFill>
-                                      <a:effectLst/>
-                                      <a:latin typeface="Cambria Math" panose="02040503050406030204" pitchFamily="18" charset="0"/>
-                                      <a:ea typeface="DengXian" panose="02010600030101010101" pitchFamily="2" charset="-122"/>
-                                      <a:cs typeface="Times New Roman" panose="02020603050405020304" pitchFamily="18" charset="0"/>
-                                    </a:rPr>
-                                    <m:t>+</m:t>
-                                  </m:r>
-                                  <m:r>
-                                    <a:rPr lang="en-US" sz="1800" i="1">
-                                      <a:solidFill>
-                                        <a:schemeClr val="tx1"/>
-                                      </a:solidFill>
-                                      <a:effectLst/>
-                                      <a:latin typeface="Cambria Math" panose="02040503050406030204" pitchFamily="18" charset="0"/>
-                                      <a:ea typeface="DengXian" panose="02010600030101010101" pitchFamily="2" charset="-122"/>
-                                      <a:cs typeface="Times New Roman" panose="02020603050405020304" pitchFamily="18" charset="0"/>
-                                    </a:rPr>
-                                    <m:t>1</m:t>
-                                  </m:r>
-                                  <m:r>
-                                    <a:rPr lang="en-US" sz="1800" i="1">
-                                      <a:solidFill>
-                                        <a:schemeClr val="tx1"/>
-                                      </a:solidFill>
-                                      <a:effectLst/>
-                                      <a:latin typeface="Cambria Math" panose="02040503050406030204" pitchFamily="18" charset="0"/>
-                                      <a:ea typeface="DengXian" panose="02010600030101010101" pitchFamily="2" charset="-122"/>
-                                      <a:cs typeface="Times New Roman" panose="02020603050405020304" pitchFamily="18" charset="0"/>
-                                    </a:rPr>
-                                    <m:t>.</m:t>
-                                  </m:r>
-                                  <m:r>
-                                    <a:rPr lang="en-US" sz="1800" i="1">
-                                      <a:solidFill>
-                                        <a:schemeClr val="tx1"/>
-                                      </a:solidFill>
-                                      <a:effectLst/>
-                                      <a:latin typeface="Cambria Math" panose="02040503050406030204" pitchFamily="18" charset="0"/>
-                                      <a:ea typeface="DengXian" panose="02010600030101010101" pitchFamily="2" charset="-122"/>
-                                      <a:cs typeface="Times New Roman" panose="02020603050405020304" pitchFamily="18" charset="0"/>
-                                    </a:rPr>
-                                    <m:t>1</m:t>
+                                    <m:t>−1−1+1+1.1</m:t>
                                   </m:r>
                                 </m:e>
                               </m:d>
@@ -18325,31 +17890,7 @@
                           <a:ea typeface="DengXian" panose="02010600030101010101" pitchFamily="2" charset="-122"/>
                           <a:cs typeface="Times New Roman" panose="02020603050405020304" pitchFamily="18" charset="0"/>
                         </a:rPr>
-                        <m:t>=</m:t>
-                      </m:r>
-                      <m:r>
-                        <a:rPr lang="en-US" sz="1800" i="1">
-                          <a:solidFill>
-                            <a:schemeClr val="tx1"/>
-                          </a:solidFill>
-                          <a:effectLst/>
-                          <a:latin typeface="Cambria Math" panose="02040503050406030204" pitchFamily="18" charset="0"/>
-                          <a:ea typeface="DengXian" panose="02010600030101010101" pitchFamily="2" charset="-122"/>
-                          <a:cs typeface="Times New Roman" panose="02020603050405020304" pitchFamily="18" charset="0"/>
-                        </a:rPr>
-                        <m:t>100</m:t>
-                      </m:r>
-                      <m:r>
-                        <a:rPr lang="en-US" sz="1800" i="1">
-                          <a:solidFill>
-                            <a:schemeClr val="tx1"/>
-                          </a:solidFill>
-                          <a:effectLst/>
-                          <a:latin typeface="Cambria Math" panose="02040503050406030204" pitchFamily="18" charset="0"/>
-                          <a:ea typeface="DengXian" panose="02010600030101010101" pitchFamily="2" charset="-122"/>
-                          <a:cs typeface="Times New Roman" panose="02020603050405020304" pitchFamily="18" charset="0"/>
-                        </a:rPr>
-                        <m:t>%</m:t>
+                        <m:t>=100%</m:t>
                       </m:r>
                     </m:oMath>
                   </m:oMathPara>
@@ -18838,106 +18379,7 @@
                                       <a:latin typeface="Cambria Math" panose="02040503050406030204" pitchFamily="18" charset="0"/>
                                       <a:ea typeface="DengXian" panose="02010600030101010101" pitchFamily="2" charset="-122"/>
                                     </a:rPr>
-                                    <m:t>−</m:t>
-                                  </m:r>
-                                  <m:r>
-                                    <a:rPr lang="en-US" sz="1800" i="1">
-                                      <a:solidFill>
-                                        <a:schemeClr val="tx1"/>
-                                      </a:solidFill>
-                                      <a:effectLst/>
-                                      <a:latin typeface="Cambria Math" panose="02040503050406030204" pitchFamily="18" charset="0"/>
-                                      <a:ea typeface="DengXian" panose="02010600030101010101" pitchFamily="2" charset="-122"/>
-                                    </a:rPr>
-                                    <m:t>1</m:t>
-                                  </m:r>
-                                  <m:r>
-                                    <a:rPr lang="en-US" sz="1800" i="1">
-                                      <a:solidFill>
-                                        <a:schemeClr val="tx1"/>
-                                      </a:solidFill>
-                                      <a:effectLst/>
-                                      <a:latin typeface="Cambria Math" panose="02040503050406030204" pitchFamily="18" charset="0"/>
-                                      <a:ea typeface="DengXian" panose="02010600030101010101" pitchFamily="2" charset="-122"/>
-                                    </a:rPr>
-                                    <m:t>−</m:t>
-                                  </m:r>
-                                  <m:r>
-                                    <a:rPr lang="en-US" sz="1800" i="1">
-                                      <a:solidFill>
-                                        <a:schemeClr val="tx1"/>
-                                      </a:solidFill>
-                                      <a:effectLst/>
-                                      <a:latin typeface="Cambria Math" panose="02040503050406030204" pitchFamily="18" charset="0"/>
-                                      <a:ea typeface="DengXian" panose="02010600030101010101" pitchFamily="2" charset="-122"/>
-                                    </a:rPr>
-                                    <m:t>1</m:t>
-                                  </m:r>
-                                  <m:r>
-                                    <a:rPr lang="en-US" sz="1800" i="1">
-                                      <a:solidFill>
-                                        <a:schemeClr val="tx1"/>
-                                      </a:solidFill>
-                                      <a:effectLst/>
-                                      <a:latin typeface="Cambria Math" panose="02040503050406030204" pitchFamily="18" charset="0"/>
-                                      <a:ea typeface="DengXian" panose="02010600030101010101" pitchFamily="2" charset="-122"/>
-                                    </a:rPr>
-                                    <m:t>+</m:t>
-                                  </m:r>
-                                  <m:r>
-                                    <a:rPr lang="en-US" sz="1800" i="1">
-                                      <a:solidFill>
-                                        <a:schemeClr val="tx1"/>
-                                      </a:solidFill>
-                                      <a:effectLst/>
-                                      <a:latin typeface="Cambria Math" panose="02040503050406030204" pitchFamily="18" charset="0"/>
-                                      <a:ea typeface="DengXian" panose="02010600030101010101" pitchFamily="2" charset="-122"/>
-                                    </a:rPr>
-                                    <m:t>1</m:t>
-                                  </m:r>
-                                  <m:r>
-                                    <a:rPr lang="en-US" sz="1800" i="1">
-                                      <a:solidFill>
-                                        <a:schemeClr val="tx1"/>
-                                      </a:solidFill>
-                                      <a:effectLst/>
-                                      <a:latin typeface="Cambria Math" panose="02040503050406030204" pitchFamily="18" charset="0"/>
-                                      <a:ea typeface="DengXian" panose="02010600030101010101" pitchFamily="2" charset="-122"/>
-                                    </a:rPr>
-                                    <m:t>+</m:t>
-                                  </m:r>
-                                  <m:r>
-                                    <a:rPr lang="en-US" sz="1800" i="1">
-                                      <a:solidFill>
-                                        <a:schemeClr val="tx1"/>
-                                      </a:solidFill>
-                                      <a:effectLst/>
-                                      <a:latin typeface="Cambria Math" panose="02040503050406030204" pitchFamily="18" charset="0"/>
-                                      <a:ea typeface="DengXian" panose="02010600030101010101" pitchFamily="2" charset="-122"/>
-                                    </a:rPr>
-                                    <m:t>1</m:t>
-                                  </m:r>
-                                  <m:r>
-                                    <a:rPr lang="en-US" sz="1800" i="1">
-                                      <a:solidFill>
-                                        <a:schemeClr val="tx1"/>
-                                      </a:solidFill>
-                                      <a:effectLst/>
-                                      <a:latin typeface="Cambria Math" panose="02040503050406030204" pitchFamily="18" charset="0"/>
-                                      <a:ea typeface="DengXian" panose="02010600030101010101" pitchFamily="2" charset="-122"/>
-                                    </a:rPr>
-                                    <m:t>.</m:t>
-                                  </m:r>
-                                  <m:r>
-                                    <a:rPr lang="en-US" sz="1800" i="1">
-                                      <a:solidFill>
-                                        <a:schemeClr val="tx1"/>
-                                      </a:solidFill>
-                                      <a:effectLst/>
-                                      <a:latin typeface="Cambria Math" panose="02040503050406030204" pitchFamily="18" charset="0"/>
-                                      <a:ea typeface="DengXian" panose="02010600030101010101" pitchFamily="2" charset="-122"/>
-                                    </a:rPr>
-                                    <m:t>1</m:t>
+                                    <m:t>−1−1+1+1.1</m:t>
                                   </m:r>
                                 </m:e>
                               </m:d>
@@ -18974,128 +18416,7 @@
                                       <a:latin typeface="Cambria Math" panose="02040503050406030204" pitchFamily="18" charset="0"/>
                                       <a:ea typeface="DengXian" panose="02010600030101010101" pitchFamily="2" charset="-122"/>
                                     </a:rPr>
-                                    <m:t>−</m:t>
-                                  </m:r>
-                                  <m:r>
-                                    <a:rPr lang="en-US" sz="1800" i="1">
-                                      <a:solidFill>
-                                        <a:schemeClr val="tx1"/>
-                                      </a:solidFill>
-                                      <a:effectLst/>
-                                      <a:latin typeface="Cambria Math" panose="02040503050406030204" pitchFamily="18" charset="0"/>
-                                      <a:ea typeface="DengXian" panose="02010600030101010101" pitchFamily="2" charset="-122"/>
-                                    </a:rPr>
-                                    <m:t>0</m:t>
-                                  </m:r>
-                                  <m:r>
-                                    <a:rPr lang="en-US" sz="1800" i="1">
-                                      <a:solidFill>
-                                        <a:schemeClr val="tx1"/>
-                                      </a:solidFill>
-                                      <a:effectLst/>
-                                      <a:latin typeface="Cambria Math" panose="02040503050406030204" pitchFamily="18" charset="0"/>
-                                      <a:ea typeface="DengXian" panose="02010600030101010101" pitchFamily="2" charset="-122"/>
-                                    </a:rPr>
-                                    <m:t>.</m:t>
-                                  </m:r>
-                                  <m:r>
-                                    <a:rPr lang="en-US" sz="1800" i="1">
-                                      <a:solidFill>
-                                        <a:schemeClr val="tx1"/>
-                                      </a:solidFill>
-                                      <a:effectLst/>
-                                      <a:latin typeface="Cambria Math" panose="02040503050406030204" pitchFamily="18" charset="0"/>
-                                      <a:ea typeface="DengXian" panose="02010600030101010101" pitchFamily="2" charset="-122"/>
-                                    </a:rPr>
-                                    <m:t>9</m:t>
-                                  </m:r>
-                                  <m:r>
-                                    <a:rPr lang="en-US" sz="1800" i="1">
-                                      <a:solidFill>
-                                        <a:schemeClr val="tx1"/>
-                                      </a:solidFill>
-                                      <a:effectLst/>
-                                      <a:latin typeface="Cambria Math" panose="02040503050406030204" pitchFamily="18" charset="0"/>
-                                      <a:ea typeface="DengXian" panose="02010600030101010101" pitchFamily="2" charset="-122"/>
-                                    </a:rPr>
-                                    <m:t>−</m:t>
-                                  </m:r>
-                                  <m:r>
-                                    <a:rPr lang="en-US" sz="1800" i="1">
-                                      <a:solidFill>
-                                        <a:schemeClr val="tx1"/>
-                                      </a:solidFill>
-                                      <a:effectLst/>
-                                      <a:latin typeface="Cambria Math" panose="02040503050406030204" pitchFamily="18" charset="0"/>
-                                      <a:ea typeface="DengXian" panose="02010600030101010101" pitchFamily="2" charset="-122"/>
-                                    </a:rPr>
-                                    <m:t>1</m:t>
-                                  </m:r>
-                                  <m:r>
-                                    <a:rPr lang="en-US" sz="1800" i="1">
-                                      <a:solidFill>
-                                        <a:schemeClr val="tx1"/>
-                                      </a:solidFill>
-                                      <a:effectLst/>
-                                      <a:latin typeface="Cambria Math" panose="02040503050406030204" pitchFamily="18" charset="0"/>
-                                      <a:ea typeface="DengXian" panose="02010600030101010101" pitchFamily="2" charset="-122"/>
-                                    </a:rPr>
-                                    <m:t>.</m:t>
-                                  </m:r>
-                                  <m:r>
-                                    <a:rPr lang="en-US" sz="1800" i="1">
-                                      <a:solidFill>
-                                        <a:schemeClr val="tx1"/>
-                                      </a:solidFill>
-                                      <a:effectLst/>
-                                      <a:latin typeface="Cambria Math" panose="02040503050406030204" pitchFamily="18" charset="0"/>
-                                      <a:ea typeface="DengXian" panose="02010600030101010101" pitchFamily="2" charset="-122"/>
-                                    </a:rPr>
-                                    <m:t>1</m:t>
-                                  </m:r>
-                                  <m:r>
-                                    <a:rPr lang="en-US" sz="1800" i="1">
-                                      <a:solidFill>
-                                        <a:schemeClr val="tx1"/>
-                                      </a:solidFill>
-                                      <a:effectLst/>
-                                      <a:latin typeface="Cambria Math" panose="02040503050406030204" pitchFamily="18" charset="0"/>
-                                      <a:ea typeface="DengXian" panose="02010600030101010101" pitchFamily="2" charset="-122"/>
-                                    </a:rPr>
-                                    <m:t>+</m:t>
-                                  </m:r>
-                                  <m:r>
-                                    <a:rPr lang="en-US" sz="1800" i="1">
-                                      <a:solidFill>
-                                        <a:schemeClr val="tx1"/>
-                                      </a:solidFill>
-                                      <a:effectLst/>
-                                      <a:latin typeface="Cambria Math" panose="02040503050406030204" pitchFamily="18" charset="0"/>
-                                      <a:ea typeface="DengXian" panose="02010600030101010101" pitchFamily="2" charset="-122"/>
-                                    </a:rPr>
-                                    <m:t>1</m:t>
-                                  </m:r>
-                                  <m:r>
-                                    <a:rPr lang="en-US" sz="1800" i="1">
-                                      <a:solidFill>
-                                        <a:schemeClr val="tx1"/>
-                                      </a:solidFill>
-                                      <a:effectLst/>
-                                      <a:latin typeface="Cambria Math" panose="02040503050406030204" pitchFamily="18" charset="0"/>
-                                      <a:ea typeface="DengXian" panose="02010600030101010101" pitchFamily="2" charset="-122"/>
-                                    </a:rPr>
-                                    <m:t>+</m:t>
-                                  </m:r>
-                                  <m:r>
-                                    <a:rPr lang="en-US" sz="1800" i="1">
-                                      <a:solidFill>
-                                        <a:schemeClr val="tx1"/>
-                                      </a:solidFill>
-                                      <a:effectLst/>
-                                      <a:latin typeface="Cambria Math" panose="02040503050406030204" pitchFamily="18" charset="0"/>
-                                      <a:ea typeface="DengXian" panose="02010600030101010101" pitchFamily="2" charset="-122"/>
-                                    </a:rPr>
-                                    <m:t>1</m:t>
+                                    <m:t>−0.9−1.1+1+1</m:t>
                                   </m:r>
                                 </m:e>
                               </m:d>
@@ -19134,29 +18455,7 @@
                                       <a:latin typeface="Cambria Math" panose="02040503050406030204" pitchFamily="18" charset="0"/>
                                       <a:ea typeface="DengXian" panose="02010600030101010101" pitchFamily="2" charset="-122"/>
                                     </a:rPr>
-                                    <m:t>(−</m:t>
-                                  </m:r>
-                                  <m:r>
-                                    <a:rPr lang="en-US" sz="1800" i="1">
-                                      <a:solidFill>
-                                        <a:schemeClr val="tx1"/>
-                                      </a:solidFill>
-                                      <a:effectLst/>
-                                      <a:latin typeface="Cambria Math" panose="02040503050406030204" pitchFamily="18" charset="0"/>
-                                      <a:ea typeface="DengXian" panose="02010600030101010101" pitchFamily="2" charset="-122"/>
-                                    </a:rPr>
-                                    <m:t>1</m:t>
-                                  </m:r>
-                                  <m:r>
-                                    <a:rPr lang="en-US" sz="1800" i="1">
-                                      <a:solidFill>
-                                        <a:schemeClr val="tx1"/>
-                                      </a:solidFill>
-                                      <a:effectLst/>
-                                      <a:latin typeface="Cambria Math" panose="02040503050406030204" pitchFamily="18" charset="0"/>
-                                      <a:ea typeface="DengXian" panose="02010600030101010101" pitchFamily="2" charset="-122"/>
-                                    </a:rPr>
-                                    <m:t>)+</m:t>
+                                    <m:t>(−1)+</m:t>
                                   </m:r>
                                   <m:r>
                                     <a:rPr lang="en-US" sz="1800" i="1">
@@ -19178,29 +18477,7 @@
                                       <a:latin typeface="Cambria Math" panose="02040503050406030204" pitchFamily="18" charset="0"/>
                                       <a:ea typeface="DengXian" panose="02010600030101010101" pitchFamily="2" charset="-122"/>
                                     </a:rPr>
-                                    <m:t>(−</m:t>
-                                  </m:r>
-                                  <m:r>
-                                    <a:rPr lang="en-US" sz="1800" i="1">
-                                      <a:solidFill>
-                                        <a:schemeClr val="tx1"/>
-                                      </a:solidFill>
-                                      <a:effectLst/>
-                                      <a:latin typeface="Cambria Math" panose="02040503050406030204" pitchFamily="18" charset="0"/>
-                                      <a:ea typeface="DengXian" panose="02010600030101010101" pitchFamily="2" charset="-122"/>
-                                    </a:rPr>
-                                    <m:t>1</m:t>
-                                  </m:r>
-                                  <m:r>
-                                    <a:rPr lang="en-US" sz="1800" i="1">
-                                      <a:solidFill>
-                                        <a:schemeClr val="tx1"/>
-                                      </a:solidFill>
-                                      <a:effectLst/>
-                                      <a:latin typeface="Cambria Math" panose="02040503050406030204" pitchFamily="18" charset="0"/>
-                                      <a:ea typeface="DengXian" panose="02010600030101010101" pitchFamily="2" charset="-122"/>
-                                    </a:rPr>
-                                    <m:t>)+</m:t>
+                                    <m:t>(−1)+</m:t>
                                   </m:r>
                                   <m:r>
                                     <a:rPr lang="en-US" sz="1800" i="1">
@@ -19222,29 +18499,7 @@
                                       <a:latin typeface="Cambria Math" panose="02040503050406030204" pitchFamily="18" charset="0"/>
                                       <a:ea typeface="DengXian" panose="02010600030101010101" pitchFamily="2" charset="-122"/>
                                     </a:rPr>
-                                    <m:t>(</m:t>
-                                  </m:r>
-                                  <m:r>
-                                    <a:rPr lang="en-US" sz="1800" i="1">
-                                      <a:solidFill>
-                                        <a:schemeClr val="tx1"/>
-                                      </a:solidFill>
-                                      <a:effectLst/>
-                                      <a:latin typeface="Cambria Math" panose="02040503050406030204" pitchFamily="18" charset="0"/>
-                                      <a:ea typeface="DengXian" panose="02010600030101010101" pitchFamily="2" charset="-122"/>
-                                    </a:rPr>
-                                    <m:t>1</m:t>
-                                  </m:r>
-                                  <m:r>
-                                    <a:rPr lang="en-US" sz="1800" i="1">
-                                      <a:solidFill>
-                                        <a:schemeClr val="tx1"/>
-                                      </a:solidFill>
-                                      <a:effectLst/>
-                                      <a:latin typeface="Cambria Math" panose="02040503050406030204" pitchFamily="18" charset="0"/>
-                                      <a:ea typeface="DengXian" panose="02010600030101010101" pitchFamily="2" charset="-122"/>
-                                    </a:rPr>
-                                    <m:t>)+</m:t>
+                                    <m:t>(1)+</m:t>
                                   </m:r>
                                   <m:r>
                                     <a:rPr lang="en-US" sz="1800" i="1">
@@ -19266,51 +18521,7 @@
                                       <a:latin typeface="Cambria Math" panose="02040503050406030204" pitchFamily="18" charset="0"/>
                                       <a:ea typeface="DengXian" panose="02010600030101010101" pitchFamily="2" charset="-122"/>
                                     </a:rPr>
-                                    <m:t>(</m:t>
-                                  </m:r>
-                                  <m:r>
-                                    <a:rPr lang="en-US" sz="1800" i="1">
-                                      <a:solidFill>
-                                        <a:schemeClr val="tx1"/>
-                                      </a:solidFill>
-                                      <a:effectLst/>
-                                      <a:latin typeface="Cambria Math" panose="02040503050406030204" pitchFamily="18" charset="0"/>
-                                      <a:ea typeface="DengXian" panose="02010600030101010101" pitchFamily="2" charset="-122"/>
-                                    </a:rPr>
-                                    <m:t>1</m:t>
-                                  </m:r>
-                                  <m:r>
-                                    <a:rPr lang="en-US" sz="1800" i="1">
-                                      <a:solidFill>
-                                        <a:schemeClr val="tx1"/>
-                                      </a:solidFill>
-                                      <a:effectLst/>
-                                      <a:latin typeface="Cambria Math" panose="02040503050406030204" pitchFamily="18" charset="0"/>
-                                      <a:ea typeface="DengXian" panose="02010600030101010101" pitchFamily="2" charset="-122"/>
-                                    </a:rPr>
-                                    <m:t>.</m:t>
-                                  </m:r>
-                                  <m:r>
-                                    <a:rPr lang="en-US" sz="1800" i="1">
-                                      <a:solidFill>
-                                        <a:schemeClr val="tx1"/>
-                                      </a:solidFill>
-                                      <a:effectLst/>
-                                      <a:latin typeface="Cambria Math" panose="02040503050406030204" pitchFamily="18" charset="0"/>
-                                      <a:ea typeface="DengXian" panose="02010600030101010101" pitchFamily="2" charset="-122"/>
-                                    </a:rPr>
-                                    <m:t>1</m:t>
-                                  </m:r>
-                                  <m:r>
-                                    <a:rPr lang="en-US" sz="1800" i="1">
-                                      <a:solidFill>
-                                        <a:schemeClr val="tx1"/>
-                                      </a:solidFill>
-                                      <a:effectLst/>
-                                      <a:latin typeface="Cambria Math" panose="02040503050406030204" pitchFamily="18" charset="0"/>
-                                      <a:ea typeface="DengXian" panose="02010600030101010101" pitchFamily="2" charset="-122"/>
-                                    </a:rPr>
-                                    <m:t>)</m:t>
+                                    <m:t>(1.1)</m:t>
                                   </m:r>
                                 </m:e>
                               </m:d>
@@ -19327,51 +18538,7 @@
                           <a:latin typeface="Cambria Math" panose="02040503050406030204" pitchFamily="18" charset="0"/>
                           <a:ea typeface="DengXian" panose="02010600030101010101" pitchFamily="2" charset="-122"/>
                         </a:rPr>
-                        <m:t>=</m:t>
-                      </m:r>
-                      <m:r>
-                        <a:rPr lang="en-US" sz="1800" i="1">
-                          <a:solidFill>
-                            <a:schemeClr val="tx1"/>
-                          </a:solidFill>
-                          <a:effectLst/>
-                          <a:latin typeface="Cambria Math" panose="02040503050406030204" pitchFamily="18" charset="0"/>
-                          <a:ea typeface="DengXian" panose="02010600030101010101" pitchFamily="2" charset="-122"/>
-                        </a:rPr>
-                        <m:t>2</m:t>
-                      </m:r>
-                      <m:r>
-                        <a:rPr lang="en-US" sz="1800" i="1">
-                          <a:solidFill>
-                            <a:schemeClr val="tx1"/>
-                          </a:solidFill>
-                          <a:effectLst/>
-                          <a:latin typeface="Cambria Math" panose="02040503050406030204" pitchFamily="18" charset="0"/>
-                          <a:ea typeface="DengXian" panose="02010600030101010101" pitchFamily="2" charset="-122"/>
-                        </a:rPr>
-                        <m:t>.</m:t>
-                      </m:r>
-                      <m:r>
-                        <a:rPr lang="en-US" sz="1800" i="1">
-                          <a:solidFill>
-                            <a:schemeClr val="tx1"/>
-                          </a:solidFill>
-                          <a:effectLst/>
-                          <a:latin typeface="Cambria Math" panose="02040503050406030204" pitchFamily="18" charset="0"/>
-                          <a:ea typeface="DengXian" panose="02010600030101010101" pitchFamily="2" charset="-122"/>
-                        </a:rPr>
-                        <m:t>44</m:t>
-                      </m:r>
-                      <m:r>
-                        <a:rPr lang="en-US" sz="1800" i="1">
-                          <a:solidFill>
-                            <a:schemeClr val="tx1"/>
-                          </a:solidFill>
-                          <a:effectLst/>
-                          <a:latin typeface="Cambria Math" panose="02040503050406030204" pitchFamily="18" charset="0"/>
-                          <a:ea typeface="DengXian" panose="02010600030101010101" pitchFamily="2" charset="-122"/>
-                        </a:rPr>
-                        <m:t>%</m:t>
+                        <m:t>=2.44%</m:t>
                       </m:r>
                     </m:oMath>
                   </m:oMathPara>
@@ -20811,8 +19978,8 @@
           </a:p>
         </p:txBody>
       </p:sp>
-      <mc:AlternateContent xmlns:mc="http://schemas.openxmlformats.org/markup-compatibility/2006">
-        <mc:Choice xmlns:a14="http://schemas.microsoft.com/office/drawing/2010/main" Requires="a14">
+      <mc:AlternateContent xmlns:mc="http://schemas.openxmlformats.org/markup-compatibility/2006" xmlns:a14="http://schemas.microsoft.com/office/drawing/2010/main">
+        <mc:Choice Requires="a14">
           <p:sp>
             <p:nvSpPr>
               <p:cNvPr id="10" name="TextBox 9">
@@ -20902,7 +20069,7 @@
             </p:txBody>
           </p:sp>
         </mc:Choice>
-        <mc:Fallback>
+        <mc:Fallback xmlns="">
           <p:sp>
             <p:nvSpPr>
               <p:cNvPr id="10" name="TextBox 9">
@@ -20953,8 +20120,8 @@
           </p:sp>
         </mc:Fallback>
       </mc:AlternateContent>
-      <mc:AlternateContent xmlns:mc="http://schemas.openxmlformats.org/markup-compatibility/2006">
-        <mc:Choice xmlns:a14="http://schemas.microsoft.com/office/drawing/2010/main" Requires="a14">
+      <mc:AlternateContent xmlns:mc="http://schemas.openxmlformats.org/markup-compatibility/2006" xmlns:a14="http://schemas.microsoft.com/office/drawing/2010/main">
+        <mc:Choice Requires="a14">
           <p:sp>
             <p:nvSpPr>
               <p:cNvPr id="13" name="TextBox 12">
@@ -21044,7 +20211,7 @@
             </p:txBody>
           </p:sp>
         </mc:Choice>
-        <mc:Fallback>
+        <mc:Fallback xmlns="">
           <p:sp>
             <p:nvSpPr>
               <p:cNvPr id="13" name="TextBox 12">
@@ -21095,8 +20262,8 @@
           </p:sp>
         </mc:Fallback>
       </mc:AlternateContent>
-      <mc:AlternateContent xmlns:mc="http://schemas.openxmlformats.org/markup-compatibility/2006">
-        <mc:Choice xmlns:a14="http://schemas.microsoft.com/office/drawing/2010/main" Requires="a14">
+      <mc:AlternateContent xmlns:mc="http://schemas.openxmlformats.org/markup-compatibility/2006" xmlns:a14="http://schemas.microsoft.com/office/drawing/2010/main">
+        <mc:Choice Requires="a14">
           <p:sp>
             <p:nvSpPr>
               <p:cNvPr id="15" name="TextBox 14">
@@ -21161,7 +20328,7 @@
             </p:txBody>
           </p:sp>
         </mc:Choice>
-        <mc:Fallback>
+        <mc:Fallback xmlns="">
           <p:sp>
             <p:nvSpPr>
               <p:cNvPr id="15" name="TextBox 14">
@@ -21863,18 +21030,7 @@
                                   </a:solidFill>
                                   <a:latin typeface="Cambria Math" panose="02040503050406030204" pitchFamily="18" charset="0"/>
                                 </a:rPr>
-                                <m:t>+</m:t>
-                              </m:r>
-                              <m:r>
-                                <a:rPr lang="en-US" sz="1800" b="0" i="1" smtClean="0">
-                                  <a:solidFill>
-                                    <a:schemeClr val="accent1">
-                                      <a:lumMod val="75000"/>
-                                    </a:schemeClr>
-                                  </a:solidFill>
-                                  <a:latin typeface="Cambria Math" panose="02040503050406030204" pitchFamily="18" charset="0"/>
-                                </a:rPr>
-                                <m:t>1</m:t>
+                                <m:t>+1</m:t>
                               </m:r>
                             </m:e>
                           </m:d>

</xml_diff>